<commit_message>
update TD2 API Alternance routes
</commit_message>
<xml_diff>
--- a/docs/CM/R4.01_Architecture_Logicielle-Chapitre3.pptx
+++ b/docs/CM/R4.01_Architecture_Logicielle-Chapitre3.pptx
@@ -229,7 +229,7 @@
           <a:p>
             <a:fld id="{5BFDD4C5-EF00-4DE8-BEEF-53090484C9F2}" type="datetimeFigureOut">
               <a:rPr lang="fr-FR" smtClean="0"/>
-              <a:t>05/03/2023</a:t>
+              <a:t>09/03/2025</a:t>
             </a:fld>
             <a:endParaRPr lang="fr-FR"/>
           </a:p>
@@ -6859,22 +6859,10 @@
             </a:pPr>
             <a:r>
               <a:rPr lang="fr-FR" dirty="0"/>
-              <a:t>Des serveurs d’applications compatibles et « standardisés » (p.ex. </a:t>
-            </a:r>
-            <a:r>
-              <a:rPr lang="fr-FR" dirty="0">
-                <a:solidFill>
-                  <a:schemeClr val="accent1"/>
-                </a:solidFill>
-              </a:rPr>
-              <a:t>Eclipse </a:t>
-            </a:r>
-            <a:r>
-              <a:rPr lang="fr-FR" dirty="0" err="1">
-                <a:solidFill>
-                  <a:schemeClr val="accent1"/>
-                </a:solidFill>
-              </a:rPr>
+              <a:t>Des serveurs d’applications compatibles et « standardisés » (p.ex. Eclipse </a:t>
+            </a:r>
+            <a:r>
+              <a:rPr lang="fr-FR" dirty="0" err="1"/>
               <a:t>GlassFish</a:t>
             </a:r>
             <a:r>
@@ -13242,7 +13230,15 @@
           <a:p>
             <a:r>
               <a:rPr lang="fr-FR" dirty="0"/>
-              <a:t>(fichier descripteur de déploiement sur les serveur d’application)</a:t>
+              <a:t>(fichier descripteur de déploiement sur </a:t>
+            </a:r>
+            <a:r>
+              <a:rPr lang="fr-FR"/>
+              <a:t>les serveurs </a:t>
+            </a:r>
+            <a:r>
+              <a:rPr lang="fr-FR" dirty="0"/>
+              <a:t>d’application)</a:t>
             </a:r>
           </a:p>
         </p:txBody>
@@ -15229,7 +15225,15 @@
           <a:p>
             <a:r>
               <a:rPr lang="fr-FR" sz="4200" dirty="0"/>
-              <a:t>Créer un service web RESTful  en Java – répondre aux requêtes </a:t>
+              <a:t>Créer un service web </a:t>
+            </a:r>
+            <a:r>
+              <a:rPr lang="fr-FR" sz="4200"/>
+              <a:t>RESTful en </a:t>
+            </a:r>
+            <a:r>
+              <a:rPr lang="fr-FR" sz="4200" dirty="0"/>
+              <a:t>Java – répondre aux requêtes </a:t>
             </a:r>
           </a:p>
         </p:txBody>
@@ -21977,7 +21981,7 @@
             <a:pPr lvl="2"/>
             <a:r>
               <a:rPr lang="fr-FR" sz="2600" dirty="0"/>
-              <a:t>Pas besoin de messages XML ou de description WSDL, car s’appui directement sur des requêtes HTTP</a:t>
+              <a:t>Pas besoin de messages XML ou de description WSDL, car s’appuie directement sur des requêtes HTTP</a:t>
             </a:r>
           </a:p>
           <a:p>
@@ -24248,7 +24252,7 @@
             <a:pPr lvl="1"/>
             <a:r>
               <a:rPr lang="fr-FR" dirty="0"/>
-              <a:t> Si les services sont agrégés ou associés à un site existant </a:t>
+              <a:t>Si les services sont agrégés ou associés à un site existant </a:t>
             </a:r>
           </a:p>
           <a:p>
@@ -24504,7 +24508,7 @@
           <a:p>
             <a:r>
               <a:rPr lang="fr-FR" dirty="0"/>
-              <a:t>Une architecture centrée sur le transfert de documents représentants des ressources, au travers de requêtes et de réponses</a:t>
+              <a:t>Une architecture centrée sur le transfert de documents représentant des ressources, au travers de requêtes et de réponses</a:t>
             </a:r>
           </a:p>
           <a:p>

</xml_diff>